<commit_message>
mowing potential functions improved
</commit_message>
<xml_diff>
--- a/Specs et architecture/algo tonte.pptx
+++ b/Specs et architecture/algo tonte.pptx
@@ -104,6 +104,11 @@
       </a:defRPr>
     </a:lvl9pPr>
   </p:defaultTextStyle>
+  <p:extLst>
+    <p:ext uri="{EFAFB233-063F-42B5-8137-9DF3F51BA10A}">
+      <p15:sldGuideLst xmlns:p15="http://schemas.microsoft.com/office/powerpoint/2012/main"/>
+    </p:ext>
+  </p:extLst>
 </p:presentation>
 </file>
 
@@ -254,7 +259,7 @@
           <a:p>
             <a:fld id="{521DA33B-B240-4AC3-B119-C48E6857DE32}" type="datetimeFigureOut">
               <a:rPr lang="fr-FR" smtClean="0"/>
-              <a:t>31/01/2019</a:t>
+              <a:t>01/02/2019</a:t>
             </a:fld>
             <a:endParaRPr lang="fr-FR"/>
           </a:p>
@@ -452,7 +457,7 @@
           <a:p>
             <a:fld id="{521DA33B-B240-4AC3-B119-C48E6857DE32}" type="datetimeFigureOut">
               <a:rPr lang="fr-FR" smtClean="0"/>
-              <a:t>31/01/2019</a:t>
+              <a:t>01/02/2019</a:t>
             </a:fld>
             <a:endParaRPr lang="fr-FR"/>
           </a:p>
@@ -660,7 +665,7 @@
           <a:p>
             <a:fld id="{521DA33B-B240-4AC3-B119-C48E6857DE32}" type="datetimeFigureOut">
               <a:rPr lang="fr-FR" smtClean="0"/>
-              <a:t>31/01/2019</a:t>
+              <a:t>01/02/2019</a:t>
             </a:fld>
             <a:endParaRPr lang="fr-FR"/>
           </a:p>
@@ -858,7 +863,7 @@
           <a:p>
             <a:fld id="{521DA33B-B240-4AC3-B119-C48E6857DE32}" type="datetimeFigureOut">
               <a:rPr lang="fr-FR" smtClean="0"/>
-              <a:t>31/01/2019</a:t>
+              <a:t>01/02/2019</a:t>
             </a:fld>
             <a:endParaRPr lang="fr-FR"/>
           </a:p>
@@ -1133,7 +1138,7 @@
           <a:p>
             <a:fld id="{521DA33B-B240-4AC3-B119-C48E6857DE32}" type="datetimeFigureOut">
               <a:rPr lang="fr-FR" smtClean="0"/>
-              <a:t>31/01/2019</a:t>
+              <a:t>01/02/2019</a:t>
             </a:fld>
             <a:endParaRPr lang="fr-FR"/>
           </a:p>
@@ -1398,7 +1403,7 @@
           <a:p>
             <a:fld id="{521DA33B-B240-4AC3-B119-C48E6857DE32}" type="datetimeFigureOut">
               <a:rPr lang="fr-FR" smtClean="0"/>
-              <a:t>31/01/2019</a:t>
+              <a:t>01/02/2019</a:t>
             </a:fld>
             <a:endParaRPr lang="fr-FR"/>
           </a:p>
@@ -1810,7 +1815,7 @@
           <a:p>
             <a:fld id="{521DA33B-B240-4AC3-B119-C48E6857DE32}" type="datetimeFigureOut">
               <a:rPr lang="fr-FR" smtClean="0"/>
-              <a:t>31/01/2019</a:t>
+              <a:t>01/02/2019</a:t>
             </a:fld>
             <a:endParaRPr lang="fr-FR"/>
           </a:p>
@@ -1951,7 +1956,7 @@
           <a:p>
             <a:fld id="{521DA33B-B240-4AC3-B119-C48E6857DE32}" type="datetimeFigureOut">
               <a:rPr lang="fr-FR" smtClean="0"/>
-              <a:t>31/01/2019</a:t>
+              <a:t>01/02/2019</a:t>
             </a:fld>
             <a:endParaRPr lang="fr-FR"/>
           </a:p>
@@ -2064,7 +2069,7 @@
           <a:p>
             <a:fld id="{521DA33B-B240-4AC3-B119-C48E6857DE32}" type="datetimeFigureOut">
               <a:rPr lang="fr-FR" smtClean="0"/>
-              <a:t>31/01/2019</a:t>
+              <a:t>01/02/2019</a:t>
             </a:fld>
             <a:endParaRPr lang="fr-FR"/>
           </a:p>
@@ -2375,7 +2380,7 @@
           <a:p>
             <a:fld id="{521DA33B-B240-4AC3-B119-C48E6857DE32}" type="datetimeFigureOut">
               <a:rPr lang="fr-FR" smtClean="0"/>
-              <a:t>31/01/2019</a:t>
+              <a:t>01/02/2019</a:t>
             </a:fld>
             <a:endParaRPr lang="fr-FR"/>
           </a:p>
@@ -2663,7 +2668,7 @@
           <a:p>
             <a:fld id="{521DA33B-B240-4AC3-B119-C48E6857DE32}" type="datetimeFigureOut">
               <a:rPr lang="fr-FR" smtClean="0"/>
-              <a:t>31/01/2019</a:t>
+              <a:t>01/02/2019</a:t>
             </a:fld>
             <a:endParaRPr lang="fr-FR"/>
           </a:p>
@@ -2904,7 +2909,7 @@
           <a:p>
             <a:fld id="{521DA33B-B240-4AC3-B119-C48E6857DE32}" type="datetimeFigureOut">
               <a:rPr lang="fr-FR" smtClean="0"/>
-              <a:t>31/01/2019</a:t>
+              <a:t>01/02/2019</a:t>
             </a:fld>
             <a:endParaRPr lang="fr-FR"/>
           </a:p>
@@ -3749,8 +3754,8 @@
         </p:nvCxnSpPr>
         <p:spPr>
           <a:xfrm flipV="1">
-            <a:off x="-132080" y="-660400"/>
-            <a:ext cx="9773920" cy="4257040"/>
+            <a:off x="724691" y="-660400"/>
+            <a:ext cx="11826443" cy="4257040"/>
           </a:xfrm>
           <a:prstGeom prst="line">
             <a:avLst/>
@@ -3785,8 +3790,8 @@
         </p:nvCxnSpPr>
         <p:spPr>
           <a:xfrm flipV="1">
-            <a:off x="-132080" y="2748280"/>
-            <a:ext cx="9773920" cy="4257040"/>
+            <a:off x="724691" y="2748280"/>
+            <a:ext cx="11826443" cy="4257040"/>
           </a:xfrm>
           <a:prstGeom prst="line">
             <a:avLst/>
@@ -3821,8 +3826,8 @@
         </p:nvCxnSpPr>
         <p:spPr>
           <a:xfrm flipV="1">
-            <a:off x="-132080" y="1043940"/>
-            <a:ext cx="9773920" cy="4257040"/>
+            <a:off x="724691" y="1043940"/>
+            <a:ext cx="11826443" cy="4257040"/>
           </a:xfrm>
           <a:prstGeom prst="line">
             <a:avLst/>
@@ -3859,8 +3864,8 @@
         </p:nvCxnSpPr>
         <p:spPr>
           <a:xfrm>
-            <a:off x="0" y="3522980"/>
-            <a:ext cx="609600" cy="1445260"/>
+            <a:off x="796143" y="3561725"/>
+            <a:ext cx="737616" cy="1445260"/>
           </a:xfrm>
           <a:prstGeom prst="line">
             <a:avLst/>
@@ -3881,6 +3886,307 @@
           </a:fontRef>
         </p:style>
       </p:cxnSp>
+      <p:cxnSp>
+        <p:nvCxnSpPr>
+          <p:cNvPr id="3" name="Connecteur droit 2"/>
+          <p:cNvCxnSpPr/>
+          <p:nvPr/>
+        </p:nvCxnSpPr>
+        <p:spPr>
+          <a:xfrm>
+            <a:off x="-274279" y="5277175"/>
+            <a:ext cx="2803567" cy="0"/>
+          </a:xfrm>
+          <a:prstGeom prst="line">
+            <a:avLst/>
+          </a:prstGeom>
+        </p:spPr>
+        <p:style>
+          <a:lnRef idx="1">
+            <a:schemeClr val="accent1"/>
+          </a:lnRef>
+          <a:fillRef idx="0">
+            <a:schemeClr val="accent1"/>
+          </a:fillRef>
+          <a:effectRef idx="0">
+            <a:schemeClr val="accent1"/>
+          </a:effectRef>
+          <a:fontRef idx="minor">
+            <a:schemeClr val="tx1"/>
+          </a:fontRef>
+        </p:style>
+      </p:cxnSp>
+      <p:sp>
+        <p:nvSpPr>
+          <p:cNvPr id="4" name="Secteurs 3"/>
+          <p:cNvSpPr/>
+          <p:nvPr/>
+        </p:nvSpPr>
+        <p:spPr>
+          <a:xfrm rot="5400000">
+            <a:off x="331919" y="4763255"/>
+            <a:ext cx="1015139" cy="1015139"/>
+          </a:xfrm>
+          <a:prstGeom prst="pie">
+            <a:avLst>
+              <a:gd name="adj1" fmla="val 14957668"/>
+              <a:gd name="adj2" fmla="val 16200000"/>
+            </a:avLst>
+          </a:prstGeom>
+        </p:spPr>
+        <p:style>
+          <a:lnRef idx="2">
+            <a:schemeClr val="accent1">
+              <a:shade val="50000"/>
+            </a:schemeClr>
+          </a:lnRef>
+          <a:fillRef idx="1">
+            <a:schemeClr val="accent1"/>
+          </a:fillRef>
+          <a:effectRef idx="0">
+            <a:schemeClr val="accent1"/>
+          </a:effectRef>
+          <a:fontRef idx="minor">
+            <a:schemeClr val="lt1"/>
+          </a:fontRef>
+        </p:style>
+        <p:txBody>
+          <a:bodyPr rtlCol="0" anchor="ctr"/>
+          <a:lstStyle/>
+          <a:p>
+            <a:pPr algn="ctr"/>
+            <a:endParaRPr lang="fr-FR">
+              <a:solidFill>
+                <a:schemeClr val="tx1"/>
+              </a:solidFill>
+            </a:endParaRPr>
+          </a:p>
+        </p:txBody>
+      </p:sp>
+      <p:sp>
+        <p:nvSpPr>
+          <p:cNvPr id="6" name="ZoneTexte 5"/>
+          <p:cNvSpPr txBox="1"/>
+          <p:nvPr/>
+        </p:nvSpPr>
+        <p:spPr>
+          <a:xfrm>
+            <a:off x="1329135" y="4974953"/>
+            <a:ext cx="399953" cy="369332"/>
+          </a:xfrm>
+          <a:prstGeom prst="rect">
+            <a:avLst/>
+          </a:prstGeom>
+          <a:noFill/>
+        </p:spPr>
+        <p:txBody>
+          <a:bodyPr wrap="none" rtlCol="0">
+            <a:spAutoFit/>
+          </a:bodyPr>
+          <a:lstStyle/>
+          <a:p>
+            <a:r>
+              <a:rPr lang="fr-FR" dirty="0" smtClean="0">
+                <a:latin typeface="Symbol" panose="05050102010706020507" pitchFamily="18" charset="2"/>
+              </a:rPr>
+              <a:t>a</a:t>
+            </a:r>
+            <a:endParaRPr lang="fr-FR" dirty="0">
+              <a:latin typeface="Symbol" panose="05050102010706020507" pitchFamily="18" charset="2"/>
+            </a:endParaRPr>
+          </a:p>
+        </p:txBody>
+      </p:sp>
+      <p:sp>
+        <p:nvSpPr>
+          <p:cNvPr id="8" name="ZoneTexte 7"/>
+          <p:cNvSpPr txBox="1"/>
+          <p:nvPr/>
+        </p:nvSpPr>
+        <p:spPr>
+          <a:xfrm>
+            <a:off x="519067" y="4104210"/>
+            <a:ext cx="334006" cy="369332"/>
+          </a:xfrm>
+          <a:prstGeom prst="rect">
+            <a:avLst/>
+          </a:prstGeom>
+          <a:noFill/>
+        </p:spPr>
+        <p:txBody>
+          <a:bodyPr wrap="none" rtlCol="0">
+            <a:spAutoFit/>
+          </a:bodyPr>
+          <a:lstStyle/>
+          <a:p>
+            <a:r>
+              <a:rPr lang="fr-FR" dirty="0" smtClean="0"/>
+              <a:t>z</a:t>
+            </a:r>
+            <a:endParaRPr lang="fr-FR" dirty="0"/>
+          </a:p>
+        </p:txBody>
+      </p:sp>
+      <p:cxnSp>
+        <p:nvCxnSpPr>
+          <p:cNvPr id="18" name="Connecteur droit 17"/>
+          <p:cNvCxnSpPr/>
+          <p:nvPr/>
+        </p:nvCxnSpPr>
+        <p:spPr>
+          <a:xfrm>
+            <a:off x="809930" y="2659380"/>
+            <a:ext cx="0" cy="4121128"/>
+          </a:xfrm>
+          <a:prstGeom prst="line">
+            <a:avLst/>
+          </a:prstGeom>
+        </p:spPr>
+        <p:style>
+          <a:lnRef idx="1">
+            <a:schemeClr val="accent1"/>
+          </a:lnRef>
+          <a:fillRef idx="0">
+            <a:schemeClr val="accent1"/>
+          </a:fillRef>
+          <a:effectRef idx="0">
+            <a:schemeClr val="accent1"/>
+          </a:effectRef>
+          <a:fontRef idx="minor">
+            <a:schemeClr val="tx1"/>
+          </a:fontRef>
+        </p:style>
+      </p:cxnSp>
+      <p:sp>
+        <p:nvSpPr>
+          <p:cNvPr id="2" name="ZoneTexte 1"/>
+          <p:cNvSpPr txBox="1"/>
+          <p:nvPr/>
+        </p:nvSpPr>
+        <p:spPr>
+          <a:xfrm flipH="1">
+            <a:off x="998865" y="728420"/>
+            <a:ext cx="6099359" cy="3139321"/>
+          </a:xfrm>
+          <a:prstGeom prst="rect">
+            <a:avLst/>
+          </a:prstGeom>
+          <a:noFill/>
+        </p:spPr>
+        <p:txBody>
+          <a:bodyPr wrap="square" rtlCol="0">
+            <a:spAutoFit/>
+          </a:bodyPr>
+          <a:lstStyle/>
+          <a:p>
+            <a:r>
+              <a:rPr lang="fr-FR" dirty="0" smtClean="0"/>
+              <a:t>Tondu </a:t>
+            </a:r>
+            <a:r>
+              <a:rPr lang="fr-FR" dirty="0" err="1" smtClean="0"/>
+              <a:t>ssi</a:t>
+            </a:r>
+            <a:endParaRPr lang="fr-FR" dirty="0"/>
+          </a:p>
+          <a:p>
+            <a:r>
+              <a:rPr lang="fr-FR" dirty="0" smtClean="0"/>
+              <a:t>a&gt;0</a:t>
+            </a:r>
+          </a:p>
+          <a:p>
+            <a:r>
+              <a:rPr lang="fr-FR" dirty="0" err="1" smtClean="0"/>
+              <a:t>C-x,C+y</a:t>
+            </a:r>
+            <a:r>
+              <a:rPr lang="fr-FR" dirty="0" smtClean="0"/>
+              <a:t> &lt; </a:t>
+            </a:r>
+            <a:r>
+              <a:rPr lang="fr-FR" dirty="0" err="1" smtClean="0"/>
+              <a:t>y+z</a:t>
+            </a:r>
+            <a:endParaRPr lang="fr-FR" dirty="0" smtClean="0"/>
+          </a:p>
+          <a:p>
+            <a:r>
+              <a:rPr lang="fr-FR" dirty="0" smtClean="0"/>
+              <a:t>&amp;</a:t>
+            </a:r>
+          </a:p>
+          <a:p>
+            <a:r>
+              <a:rPr lang="fr-FR" dirty="0" err="1" smtClean="0"/>
+              <a:t>C+x,C-y</a:t>
+            </a:r>
+            <a:r>
+              <a:rPr lang="fr-FR" dirty="0" smtClean="0"/>
+              <a:t>&gt;y-z</a:t>
+            </a:r>
+          </a:p>
+          <a:p>
+            <a:r>
+              <a:rPr lang="fr-FR" dirty="0" smtClean="0"/>
+              <a:t>a&lt;0</a:t>
+            </a:r>
+          </a:p>
+          <a:p>
+            <a:r>
+              <a:rPr lang="fr-FR" dirty="0" err="1" smtClean="0"/>
+              <a:t>C+x,C+y</a:t>
+            </a:r>
+            <a:r>
+              <a:rPr lang="fr-FR" dirty="0" smtClean="0"/>
+              <a:t> </a:t>
+            </a:r>
+            <a:r>
+              <a:rPr lang="fr-FR" dirty="0"/>
+              <a:t>&lt; </a:t>
+            </a:r>
+            <a:r>
+              <a:rPr lang="fr-FR" dirty="0" err="1"/>
+              <a:t>y+z</a:t>
+            </a:r>
+            <a:endParaRPr lang="fr-FR" dirty="0"/>
+          </a:p>
+          <a:p>
+            <a:r>
+              <a:rPr lang="fr-FR" dirty="0"/>
+              <a:t>&amp;</a:t>
+            </a:r>
+          </a:p>
+          <a:p>
+            <a:r>
+              <a:rPr lang="fr-FR" dirty="0" err="1" smtClean="0"/>
+              <a:t>C-x,C-y</a:t>
+            </a:r>
+            <a:r>
+              <a:rPr lang="fr-FR" dirty="0" smtClean="0"/>
+              <a:t>&gt;y-z</a:t>
+            </a:r>
+            <a:endParaRPr lang="fr-FR" dirty="0"/>
+          </a:p>
+          <a:p>
+            <a:endParaRPr lang="fr-FR" dirty="0" smtClean="0"/>
+          </a:p>
+          <a:p>
+            <a:r>
+              <a:rPr lang="fr-FR" dirty="0"/>
+              <a:t>z=</a:t>
+            </a:r>
+            <a:r>
+              <a:rPr lang="fr-FR" dirty="0" err="1"/>
+              <a:t>mow_largeur</a:t>
+            </a:r>
+            <a:r>
+              <a:rPr lang="fr-FR" dirty="0"/>
+              <a:t>/2/cos(alpha</a:t>
+            </a:r>
+          </a:p>
+        </p:txBody>
+      </p:sp>
     </p:spTree>
     <p:extLst>
       <p:ext uri="{BB962C8B-B14F-4D97-AF65-F5344CB8AC3E}">

</xml_diff>